<commit_message>
improved report + ppt
</commit_message>
<xml_diff>
--- a/presentation-first.pptx
+++ b/presentation-first.pptx
@@ -5,7 +5,7 @@
     <p:sldMasterId id="2147483648" r:id="rId1"/>
   </p:sldMasterIdLst>
   <p:notesMasterIdLst>
-    <p:notesMasterId r:id="rId16"/>
+    <p:notesMasterId r:id="rId19"/>
   </p:notesMasterIdLst>
   <p:sldIdLst>
     <p:sldId id="256" r:id="rId2"/>
@@ -18,10 +18,13 @@
     <p:sldId id="292" r:id="rId9"/>
     <p:sldId id="284" r:id="rId10"/>
     <p:sldId id="287" r:id="rId11"/>
-    <p:sldId id="293" r:id="rId12"/>
-    <p:sldId id="290" r:id="rId13"/>
-    <p:sldId id="288" r:id="rId14"/>
-    <p:sldId id="273" r:id="rId15"/>
+    <p:sldId id="294" r:id="rId12"/>
+    <p:sldId id="297" r:id="rId13"/>
+    <p:sldId id="293" r:id="rId14"/>
+    <p:sldId id="290" r:id="rId15"/>
+    <p:sldId id="288" r:id="rId16"/>
+    <p:sldId id="273" r:id="rId17"/>
+    <p:sldId id="295" r:id="rId18"/>
   </p:sldIdLst>
   <p:sldSz cx="12192000" cy="6858000"/>
   <p:notesSz cx="6858000" cy="9144000"/>
@@ -210,7 +213,7 @@
           <a:p>
             <a:fld id="{03D596B5-48C3-4BEF-A191-411AA0F4F1B7}" type="datetimeFigureOut">
               <a:rPr lang="zh-CN" altLang="en-US" smtClean="0"/>
-              <a:t>2023/11/8</a:t>
+              <a:t>2023/11/9</a:t>
             </a:fld>
             <a:endParaRPr lang="zh-CN" altLang="en-US"/>
           </a:p>
@@ -742,7 +745,7 @@
           <a:p>
             <a:fld id="{680F9DE7-D48B-4F0F-BBA6-52340702512A}" type="slidenum">
               <a:rPr lang="zh-CN" altLang="en-US" smtClean="0"/>
-              <a:t>11</a:t>
+              <a:t>13</a:t>
             </a:fld>
             <a:endParaRPr lang="zh-CN" altLang="en-US"/>
           </a:p>
@@ -845,7 +848,7 @@
           <a:p>
             <a:fld id="{680F9DE7-D48B-4F0F-BBA6-52340702512A}" type="slidenum">
               <a:rPr lang="zh-CN" altLang="en-US" smtClean="0"/>
-              <a:t>12</a:t>
+              <a:t>14</a:t>
             </a:fld>
             <a:endParaRPr lang="zh-CN" altLang="en-US"/>
           </a:p>
@@ -948,7 +951,7 @@
           <a:p>
             <a:fld id="{680F9DE7-D48B-4F0F-BBA6-52340702512A}" type="slidenum">
               <a:rPr lang="zh-CN" altLang="en-US" smtClean="0"/>
-              <a:t>13</a:t>
+              <a:t>15</a:t>
             </a:fld>
             <a:endParaRPr lang="zh-CN" altLang="en-US"/>
           </a:p>
@@ -1032,7 +1035,7 @@
           <a:p>
             <a:fld id="{680F9DE7-D48B-4F0F-BBA6-52340702512A}" type="slidenum">
               <a:rPr lang="zh-CN" altLang="en-US" smtClean="0"/>
-              <a:t>14</a:t>
+              <a:t>16</a:t>
             </a:fld>
             <a:endParaRPr lang="zh-CN" altLang="en-US"/>
           </a:p>
@@ -1937,7 +1940,7 @@
           <a:p>
             <a:fld id="{D48BC00B-01DA-4CD4-978B-0B50A307C9E4}" type="datetimeFigureOut">
               <a:rPr lang="zh-CN" altLang="en-US" smtClean="0"/>
-              <a:t>2023/11/8</a:t>
+              <a:t>2023/11/9</a:t>
             </a:fld>
             <a:endParaRPr lang="zh-CN" altLang="en-US"/>
           </a:p>
@@ -2135,7 +2138,7 @@
           <a:p>
             <a:fld id="{D48BC00B-01DA-4CD4-978B-0B50A307C9E4}" type="datetimeFigureOut">
               <a:rPr lang="zh-CN" altLang="en-US" smtClean="0"/>
-              <a:t>2023/11/8</a:t>
+              <a:t>2023/11/9</a:t>
             </a:fld>
             <a:endParaRPr lang="zh-CN" altLang="en-US"/>
           </a:p>
@@ -2343,7 +2346,7 @@
           <a:p>
             <a:fld id="{D48BC00B-01DA-4CD4-978B-0B50A307C9E4}" type="datetimeFigureOut">
               <a:rPr lang="zh-CN" altLang="en-US" smtClean="0"/>
-              <a:t>2023/11/8</a:t>
+              <a:t>2023/11/9</a:t>
             </a:fld>
             <a:endParaRPr lang="zh-CN" altLang="en-US"/>
           </a:p>
@@ -2541,7 +2544,7 @@
           <a:p>
             <a:fld id="{D48BC00B-01DA-4CD4-978B-0B50A307C9E4}" type="datetimeFigureOut">
               <a:rPr lang="zh-CN" altLang="en-US" smtClean="0"/>
-              <a:t>2023/11/8</a:t>
+              <a:t>2023/11/9</a:t>
             </a:fld>
             <a:endParaRPr lang="zh-CN" altLang="en-US"/>
           </a:p>
@@ -2816,7 +2819,7 @@
           <a:p>
             <a:fld id="{D48BC00B-01DA-4CD4-978B-0B50A307C9E4}" type="datetimeFigureOut">
               <a:rPr lang="zh-CN" altLang="en-US" smtClean="0"/>
-              <a:t>2023/11/8</a:t>
+              <a:t>2023/11/9</a:t>
             </a:fld>
             <a:endParaRPr lang="zh-CN" altLang="en-US"/>
           </a:p>
@@ -3081,7 +3084,7 @@
           <a:p>
             <a:fld id="{D48BC00B-01DA-4CD4-978B-0B50A307C9E4}" type="datetimeFigureOut">
               <a:rPr lang="zh-CN" altLang="en-US" smtClean="0"/>
-              <a:t>2023/11/8</a:t>
+              <a:t>2023/11/9</a:t>
             </a:fld>
             <a:endParaRPr lang="zh-CN" altLang="en-US"/>
           </a:p>
@@ -3493,7 +3496,7 @@
           <a:p>
             <a:fld id="{D48BC00B-01DA-4CD4-978B-0B50A307C9E4}" type="datetimeFigureOut">
               <a:rPr lang="zh-CN" altLang="en-US" smtClean="0"/>
-              <a:t>2023/11/8</a:t>
+              <a:t>2023/11/9</a:t>
             </a:fld>
             <a:endParaRPr lang="zh-CN" altLang="en-US"/>
           </a:p>
@@ -3634,7 +3637,7 @@
           <a:p>
             <a:fld id="{D48BC00B-01DA-4CD4-978B-0B50A307C9E4}" type="datetimeFigureOut">
               <a:rPr lang="zh-CN" altLang="en-US" smtClean="0"/>
-              <a:t>2023/11/8</a:t>
+              <a:t>2023/11/9</a:t>
             </a:fld>
             <a:endParaRPr lang="zh-CN" altLang="en-US"/>
           </a:p>
@@ -3747,7 +3750,7 @@
           <a:p>
             <a:fld id="{D48BC00B-01DA-4CD4-978B-0B50A307C9E4}" type="datetimeFigureOut">
               <a:rPr lang="zh-CN" altLang="en-US" smtClean="0"/>
-              <a:t>2023/11/8</a:t>
+              <a:t>2023/11/9</a:t>
             </a:fld>
             <a:endParaRPr lang="zh-CN" altLang="en-US"/>
           </a:p>
@@ -4058,7 +4061,7 @@
           <a:p>
             <a:fld id="{D48BC00B-01DA-4CD4-978B-0B50A307C9E4}" type="datetimeFigureOut">
               <a:rPr lang="zh-CN" altLang="en-US" smtClean="0"/>
-              <a:t>2023/11/8</a:t>
+              <a:t>2023/11/9</a:t>
             </a:fld>
             <a:endParaRPr lang="zh-CN" altLang="en-US"/>
           </a:p>
@@ -4346,7 +4349,7 @@
           <a:p>
             <a:fld id="{D48BC00B-01DA-4CD4-978B-0B50A307C9E4}" type="datetimeFigureOut">
               <a:rPr lang="zh-CN" altLang="en-US" smtClean="0"/>
-              <a:t>2023/11/8</a:t>
+              <a:t>2023/11/9</a:t>
             </a:fld>
             <a:endParaRPr lang="zh-CN" altLang="en-US"/>
           </a:p>
@@ -4587,7 +4590,7 @@
           <a:p>
             <a:fld id="{D48BC00B-01DA-4CD4-978B-0B50A307C9E4}" type="datetimeFigureOut">
               <a:rPr lang="zh-CN" altLang="en-US" smtClean="0"/>
-              <a:t>2023/11/8</a:t>
+              <a:t>2023/11/9</a:t>
             </a:fld>
             <a:endParaRPr lang="zh-CN" altLang="en-US"/>
           </a:p>
@@ -5089,7 +5092,7 @@
               <a:rPr lang="en-US" altLang="zh-CN" dirty="0">
                 <a:latin typeface="PingFang SC"/>
               </a:rPr>
-              <a:t>Kenneth Zhang</a:t>
+              <a:t>Zhang Kenneth</a:t>
             </a:r>
           </a:p>
           <a:p>
@@ -5103,16 +5106,25 @@
               <a:rPr lang="en-US" altLang="zh-CN" dirty="0">
                 <a:latin typeface="PingFang SC"/>
               </a:rPr>
-              <a:t> Wang (12011425)</a:t>
-            </a:r>
-          </a:p>
-          <a:p>
-            <a:r>
-              <a:rPr lang="zh-CN" altLang="en-US" dirty="0">
-                <a:latin typeface="PingFang SC"/>
-              </a:rPr>
-              <a:t>徐匡劼</a:t>
-            </a:r>
+              <a:t> Wang</a:t>
+            </a:r>
+          </a:p>
+          <a:p>
+            <a:r>
+              <a:rPr lang="en-US" altLang="zh-CN" dirty="0" err="1">
+                <a:latin typeface="PingFang SC"/>
+              </a:rPr>
+              <a:t>Kuangjie</a:t>
+            </a:r>
+            <a:r>
+              <a:rPr lang="en-US" altLang="zh-CN" dirty="0">
+                <a:latin typeface="PingFang SC"/>
+              </a:rPr>
+              <a:t> Xu</a:t>
+            </a:r>
+            <a:endParaRPr lang="zh-CN" altLang="en-US" dirty="0">
+              <a:latin typeface="PingFang SC"/>
+            </a:endParaRPr>
           </a:p>
         </p:txBody>
       </p:sp>
@@ -5248,6 +5260,468 @@
 </file>
 
 <file path=ppt/slides/slide11.xml><?xml version="1.0" encoding="utf-8"?>
+<p:sld xmlns:a="http://schemas.openxmlformats.org/drawingml/2006/main" xmlns:r="http://schemas.openxmlformats.org/officeDocument/2006/relationships" xmlns:p="http://schemas.openxmlformats.org/presentationml/2006/main">
+  <p:cSld>
+    <p:spTree>
+      <p:nvGrpSpPr>
+        <p:cNvPr id="1" name=""/>
+        <p:cNvGrpSpPr/>
+        <p:nvPr/>
+      </p:nvGrpSpPr>
+      <p:grpSpPr>
+        <a:xfrm>
+          <a:off x="0" y="0"/>
+          <a:ext cx="0" cy="0"/>
+          <a:chOff x="0" y="0"/>
+          <a:chExt cx="0" cy="0"/>
+        </a:xfrm>
+      </p:grpSpPr>
+      <p:sp>
+        <p:nvSpPr>
+          <p:cNvPr id="2" name="Title 1">
+            <a:extLst>
+              <a:ext uri="{FF2B5EF4-FFF2-40B4-BE49-F238E27FC236}">
+                <a16:creationId xmlns:a16="http://schemas.microsoft.com/office/drawing/2014/main" id="{92F64C7E-D299-AC9A-CD7A-5B74D0CD8DAF}"/>
+              </a:ext>
+            </a:extLst>
+          </p:cNvPr>
+          <p:cNvSpPr>
+            <a:spLocks noGrp="1"/>
+          </p:cNvSpPr>
+          <p:nvPr>
+            <p:ph type="title"/>
+          </p:nvPr>
+        </p:nvSpPr>
+        <p:spPr/>
+        <p:txBody>
+          <a:bodyPr/>
+          <a:lstStyle/>
+          <a:p>
+            <a:r>
+              <a:rPr lang="en-US" dirty="0">
+                <a:latin typeface="PingFang SC"/>
+              </a:rPr>
+              <a:t>Key concepts:</a:t>
+            </a:r>
+            <a:endParaRPr lang="en-US" dirty="0"/>
+          </a:p>
+        </p:txBody>
+      </p:sp>
+      <p:sp>
+        <p:nvSpPr>
+          <p:cNvPr id="3" name="Content Placeholder 2">
+            <a:extLst>
+              <a:ext uri="{FF2B5EF4-FFF2-40B4-BE49-F238E27FC236}">
+                <a16:creationId xmlns:a16="http://schemas.microsoft.com/office/drawing/2014/main" id="{91F355B0-6BA8-0C61-D90D-AD5DFE1F8FCB}"/>
+              </a:ext>
+            </a:extLst>
+          </p:cNvPr>
+          <p:cNvSpPr>
+            <a:spLocks noGrp="1"/>
+          </p:cNvSpPr>
+          <p:nvPr>
+            <p:ph idx="1"/>
+          </p:nvPr>
+        </p:nvSpPr>
+        <p:spPr/>
+        <p:txBody>
+          <a:bodyPr/>
+          <a:lstStyle/>
+          <a:p>
+            <a:r>
+              <a:rPr lang="en-US" dirty="0">
+                <a:latin typeface="Times New Roman" panose="02020603050405020304" pitchFamily="18" charset="0"/>
+                <a:cs typeface="Times New Roman" panose="02020603050405020304" pitchFamily="18" charset="0"/>
+              </a:rPr>
+              <a:t>Elitism</a:t>
+            </a:r>
+          </a:p>
+          <a:p>
+            <a:pPr marL="0" indent="0">
+              <a:buNone/>
+            </a:pPr>
+            <a:endParaRPr lang="en-US" dirty="0">
+              <a:latin typeface="Times New Roman" panose="02020603050405020304" pitchFamily="18" charset="0"/>
+              <a:cs typeface="Times New Roman" panose="02020603050405020304" pitchFamily="18" charset="0"/>
+            </a:endParaRPr>
+          </a:p>
+        </p:txBody>
+      </p:sp>
+      <p:pic>
+        <p:nvPicPr>
+          <p:cNvPr id="4" name="内容占位符 6">
+            <a:extLst>
+              <a:ext uri="{FF2B5EF4-FFF2-40B4-BE49-F238E27FC236}">
+                <a16:creationId xmlns:a16="http://schemas.microsoft.com/office/drawing/2014/main" id="{95F3067B-90FF-D863-CCFD-03944F4A70FE}"/>
+              </a:ext>
+            </a:extLst>
+          </p:cNvPr>
+          <p:cNvPicPr>
+            <a:picLocks noChangeAspect="1"/>
+          </p:cNvPicPr>
+          <p:nvPr/>
+        </p:nvPicPr>
+        <p:blipFill>
+          <a:blip r:embed="rId2"/>
+          <a:stretch>
+            <a:fillRect/>
+          </a:stretch>
+        </p:blipFill>
+        <p:spPr>
+          <a:xfrm>
+            <a:off x="838200" y="2584568"/>
+            <a:ext cx="4471961" cy="2992032"/>
+          </a:xfrm>
+          <a:prstGeom prst="rect">
+            <a:avLst/>
+          </a:prstGeom>
+        </p:spPr>
+      </p:pic>
+      <p:pic>
+        <p:nvPicPr>
+          <p:cNvPr id="7" name="Picture 6">
+            <a:extLst>
+              <a:ext uri="{FF2B5EF4-FFF2-40B4-BE49-F238E27FC236}">
+                <a16:creationId xmlns:a16="http://schemas.microsoft.com/office/drawing/2014/main" id="{4E1133CA-ABEE-6522-F5E3-1B216D37D133}"/>
+              </a:ext>
+            </a:extLst>
+          </p:cNvPr>
+          <p:cNvPicPr>
+            <a:picLocks noChangeAspect="1"/>
+          </p:cNvPicPr>
+          <p:nvPr/>
+        </p:nvPicPr>
+        <p:blipFill>
+          <a:blip r:embed="rId3"/>
+          <a:stretch>
+            <a:fillRect/>
+          </a:stretch>
+        </p:blipFill>
+        <p:spPr>
+          <a:xfrm>
+            <a:off x="5795871" y="2851511"/>
+            <a:ext cx="5691678" cy="2458145"/>
+          </a:xfrm>
+          <a:prstGeom prst="rect">
+            <a:avLst/>
+          </a:prstGeom>
+        </p:spPr>
+      </p:pic>
+      <p:sp>
+        <p:nvSpPr>
+          <p:cNvPr id="8" name="TextBox 7">
+            <a:extLst>
+              <a:ext uri="{FF2B5EF4-FFF2-40B4-BE49-F238E27FC236}">
+                <a16:creationId xmlns:a16="http://schemas.microsoft.com/office/drawing/2014/main" id="{9E81C58A-5AE5-DBF3-258D-949F4D0AA680}"/>
+              </a:ext>
+            </a:extLst>
+          </p:cNvPr>
+          <p:cNvSpPr txBox="1"/>
+          <p:nvPr/>
+        </p:nvSpPr>
+        <p:spPr>
+          <a:xfrm>
+            <a:off x="1836932" y="5576600"/>
+            <a:ext cx="3740727" cy="369332"/>
+          </a:xfrm>
+          <a:prstGeom prst="rect">
+            <a:avLst/>
+          </a:prstGeom>
+          <a:noFill/>
+        </p:spPr>
+        <p:txBody>
+          <a:bodyPr wrap="square" rtlCol="0">
+            <a:spAutoFit/>
+          </a:bodyPr>
+          <a:lstStyle/>
+          <a:p>
+            <a:r>
+              <a:rPr lang="en-US" dirty="0"/>
+              <a:t>NSGA-II’s elitist approach</a:t>
+            </a:r>
+          </a:p>
+        </p:txBody>
+      </p:sp>
+      <p:sp>
+        <p:nvSpPr>
+          <p:cNvPr id="9" name="TextBox 8">
+            <a:extLst>
+              <a:ext uri="{FF2B5EF4-FFF2-40B4-BE49-F238E27FC236}">
+                <a16:creationId xmlns:a16="http://schemas.microsoft.com/office/drawing/2014/main" id="{53EDBEE5-376A-1E72-CE75-A61CCE18BC93}"/>
+              </a:ext>
+            </a:extLst>
+          </p:cNvPr>
+          <p:cNvSpPr txBox="1"/>
+          <p:nvPr/>
+        </p:nvSpPr>
+        <p:spPr>
+          <a:xfrm>
+            <a:off x="6771346" y="5584188"/>
+            <a:ext cx="3740727" cy="369332"/>
+          </a:xfrm>
+          <a:prstGeom prst="rect">
+            <a:avLst/>
+          </a:prstGeom>
+          <a:noFill/>
+        </p:spPr>
+        <p:txBody>
+          <a:bodyPr wrap="square" rtlCol="0">
+            <a:spAutoFit/>
+          </a:bodyPr>
+          <a:lstStyle/>
+          <a:p>
+            <a:r>
+              <a:rPr lang="en-US" dirty="0"/>
+              <a:t>SPEA-II’s archive truncation strategy</a:t>
+            </a:r>
+          </a:p>
+        </p:txBody>
+      </p:sp>
+    </p:spTree>
+    <p:extLst>
+      <p:ext uri="{BB962C8B-B14F-4D97-AF65-F5344CB8AC3E}">
+        <p14:creationId xmlns:p14="http://schemas.microsoft.com/office/powerpoint/2010/main" val="2014757348"/>
+      </p:ext>
+    </p:extLst>
+  </p:cSld>
+  <p:clrMapOvr>
+    <a:masterClrMapping/>
+  </p:clrMapOvr>
+</p:sld>
+</file>
+
+<file path=ppt/slides/slide12.xml><?xml version="1.0" encoding="utf-8"?>
+<p:sld xmlns:a="http://schemas.openxmlformats.org/drawingml/2006/main" xmlns:r="http://schemas.openxmlformats.org/officeDocument/2006/relationships" xmlns:p="http://schemas.openxmlformats.org/presentationml/2006/main">
+  <p:cSld>
+    <p:spTree>
+      <p:nvGrpSpPr>
+        <p:cNvPr id="1" name=""/>
+        <p:cNvGrpSpPr/>
+        <p:nvPr/>
+      </p:nvGrpSpPr>
+      <p:grpSpPr>
+        <a:xfrm>
+          <a:off x="0" y="0"/>
+          <a:ext cx="0" cy="0"/>
+          <a:chOff x="0" y="0"/>
+          <a:chExt cx="0" cy="0"/>
+        </a:xfrm>
+      </p:grpSpPr>
+      <p:sp>
+        <p:nvSpPr>
+          <p:cNvPr id="2" name="Title 1">
+            <a:extLst>
+              <a:ext uri="{FF2B5EF4-FFF2-40B4-BE49-F238E27FC236}">
+                <a16:creationId xmlns:a16="http://schemas.microsoft.com/office/drawing/2014/main" id="{92F64C7E-D299-AC9A-CD7A-5B74D0CD8DAF}"/>
+              </a:ext>
+            </a:extLst>
+          </p:cNvPr>
+          <p:cNvSpPr>
+            <a:spLocks noGrp="1"/>
+          </p:cNvSpPr>
+          <p:nvPr>
+            <p:ph type="title"/>
+          </p:nvPr>
+        </p:nvSpPr>
+        <p:spPr/>
+        <p:txBody>
+          <a:bodyPr/>
+          <a:lstStyle/>
+          <a:p>
+            <a:r>
+              <a:rPr lang="en-US" dirty="0">
+                <a:latin typeface="PingFang SC"/>
+              </a:rPr>
+              <a:t>Key concepts:</a:t>
+            </a:r>
+            <a:endParaRPr lang="en-US" dirty="0"/>
+          </a:p>
+        </p:txBody>
+      </p:sp>
+      <p:sp>
+        <p:nvSpPr>
+          <p:cNvPr id="3" name="Content Placeholder 2">
+            <a:extLst>
+              <a:ext uri="{FF2B5EF4-FFF2-40B4-BE49-F238E27FC236}">
+                <a16:creationId xmlns:a16="http://schemas.microsoft.com/office/drawing/2014/main" id="{91F355B0-6BA8-0C61-D90D-AD5DFE1F8FCB}"/>
+              </a:ext>
+            </a:extLst>
+          </p:cNvPr>
+          <p:cNvSpPr>
+            <a:spLocks noGrp="1"/>
+          </p:cNvSpPr>
+          <p:nvPr>
+            <p:ph idx="1"/>
+          </p:nvPr>
+        </p:nvSpPr>
+        <p:spPr/>
+        <p:txBody>
+          <a:bodyPr/>
+          <a:lstStyle/>
+          <a:p>
+            <a:r>
+              <a:rPr lang="en-US" dirty="0">
+                <a:latin typeface="Times New Roman" panose="02020603050405020304" pitchFamily="18" charset="0"/>
+                <a:cs typeface="Times New Roman" panose="02020603050405020304" pitchFamily="18" charset="0"/>
+              </a:rPr>
+              <a:t>Hypervolume</a:t>
+            </a:r>
+          </a:p>
+          <a:p>
+            <a:pPr marL="0" indent="0">
+              <a:buNone/>
+            </a:pPr>
+            <a:endParaRPr lang="en-US" dirty="0">
+              <a:latin typeface="Times New Roman" panose="02020603050405020304" pitchFamily="18" charset="0"/>
+              <a:cs typeface="Times New Roman" panose="02020603050405020304" pitchFamily="18" charset="0"/>
+            </a:endParaRPr>
+          </a:p>
+        </p:txBody>
+      </p:sp>
+      <p:sp>
+        <p:nvSpPr>
+          <p:cNvPr id="8" name="TextBox 7">
+            <a:extLst>
+              <a:ext uri="{FF2B5EF4-FFF2-40B4-BE49-F238E27FC236}">
+                <a16:creationId xmlns:a16="http://schemas.microsoft.com/office/drawing/2014/main" id="{9E81C58A-5AE5-DBF3-258D-949F4D0AA680}"/>
+              </a:ext>
+            </a:extLst>
+          </p:cNvPr>
+          <p:cNvSpPr txBox="1"/>
+          <p:nvPr/>
+        </p:nvSpPr>
+        <p:spPr>
+          <a:xfrm>
+            <a:off x="1836932" y="5576600"/>
+            <a:ext cx="3740727" cy="369332"/>
+          </a:xfrm>
+          <a:prstGeom prst="rect">
+            <a:avLst/>
+          </a:prstGeom>
+          <a:noFill/>
+        </p:spPr>
+        <p:txBody>
+          <a:bodyPr wrap="square" rtlCol="0">
+            <a:spAutoFit/>
+          </a:bodyPr>
+          <a:lstStyle/>
+          <a:p>
+            <a:r>
+              <a:rPr lang="en-US" dirty="0"/>
+              <a:t>Definition of Hypervolume</a:t>
+            </a:r>
+          </a:p>
+        </p:txBody>
+      </p:sp>
+      <p:sp>
+        <p:nvSpPr>
+          <p:cNvPr id="9" name="TextBox 8">
+            <a:extLst>
+              <a:ext uri="{FF2B5EF4-FFF2-40B4-BE49-F238E27FC236}">
+                <a16:creationId xmlns:a16="http://schemas.microsoft.com/office/drawing/2014/main" id="{53EDBEE5-376A-1E72-CE75-A61CCE18BC93}"/>
+              </a:ext>
+            </a:extLst>
+          </p:cNvPr>
+          <p:cNvSpPr txBox="1"/>
+          <p:nvPr/>
+        </p:nvSpPr>
+        <p:spPr>
+          <a:xfrm>
+            <a:off x="6194650" y="5622766"/>
+            <a:ext cx="3740727" cy="646331"/>
+          </a:xfrm>
+          <a:prstGeom prst="rect">
+            <a:avLst/>
+          </a:prstGeom>
+          <a:noFill/>
+        </p:spPr>
+        <p:txBody>
+          <a:bodyPr wrap="square" rtlCol="0">
+            <a:spAutoFit/>
+          </a:bodyPr>
+          <a:lstStyle/>
+          <a:p>
+            <a:r>
+              <a:rPr lang="en-US" dirty="0"/>
+              <a:t>SMS-EMOA uses hypervolume to leverage delta performance</a:t>
+            </a:r>
+          </a:p>
+        </p:txBody>
+      </p:sp>
+      <p:pic>
+        <p:nvPicPr>
+          <p:cNvPr id="5" name="图片 5">
+            <a:extLst>
+              <a:ext uri="{FF2B5EF4-FFF2-40B4-BE49-F238E27FC236}">
+                <a16:creationId xmlns:a16="http://schemas.microsoft.com/office/drawing/2014/main" id="{4FDE82D6-1881-6BC9-6250-0013BE396B3B}"/>
+              </a:ext>
+            </a:extLst>
+          </p:cNvPr>
+          <p:cNvPicPr>
+            <a:picLocks noChangeAspect="1"/>
+          </p:cNvPicPr>
+          <p:nvPr/>
+        </p:nvPicPr>
+        <p:blipFill>
+          <a:blip r:embed="rId2"/>
+          <a:stretch>
+            <a:fillRect/>
+          </a:stretch>
+        </p:blipFill>
+        <p:spPr>
+          <a:xfrm>
+            <a:off x="1471871" y="2534131"/>
+            <a:ext cx="3690329" cy="2907532"/>
+          </a:xfrm>
+          <a:prstGeom prst="rect">
+            <a:avLst/>
+          </a:prstGeom>
+        </p:spPr>
+      </p:pic>
+      <p:pic>
+        <p:nvPicPr>
+          <p:cNvPr id="10" name="Picture 9">
+            <a:extLst>
+              <a:ext uri="{FF2B5EF4-FFF2-40B4-BE49-F238E27FC236}">
+                <a16:creationId xmlns:a16="http://schemas.microsoft.com/office/drawing/2014/main" id="{6B593F1E-3F1A-6671-67E4-DD4671F3BC3F}"/>
+              </a:ext>
+            </a:extLst>
+          </p:cNvPr>
+          <p:cNvPicPr>
+            <a:picLocks noChangeAspect="1"/>
+          </p:cNvPicPr>
+          <p:nvPr/>
+        </p:nvPicPr>
+        <p:blipFill>
+          <a:blip r:embed="rId3"/>
+          <a:stretch>
+            <a:fillRect/>
+          </a:stretch>
+        </p:blipFill>
+        <p:spPr>
+          <a:xfrm>
+            <a:off x="6194650" y="2761923"/>
+            <a:ext cx="4525479" cy="2679740"/>
+          </a:xfrm>
+          <a:prstGeom prst="rect">
+            <a:avLst/>
+          </a:prstGeom>
+        </p:spPr>
+      </p:pic>
+    </p:spTree>
+    <p:extLst>
+      <p:ext uri="{BB962C8B-B14F-4D97-AF65-F5344CB8AC3E}">
+        <p14:creationId xmlns:p14="http://schemas.microsoft.com/office/powerpoint/2010/main" val="3379269895"/>
+      </p:ext>
+    </p:extLst>
+  </p:cSld>
+  <p:clrMapOvr>
+    <a:masterClrMapping/>
+  </p:clrMapOvr>
+</p:sld>
+</file>
+
+<file path=ppt/slides/slide13.xml><?xml version="1.0" encoding="utf-8"?>
 <p:sld xmlns:a="http://schemas.openxmlformats.org/drawingml/2006/main" xmlns:r="http://schemas.openxmlformats.org/officeDocument/2006/relationships" xmlns:p="http://schemas.openxmlformats.org/presentationml/2006/main">
   <p:cSld>
     <p:spTree>
@@ -5609,6 +6083,30 @@
               <a:t>Sub-population transfer (guided by non-dominated individual gradient)</a:t>
             </a:r>
           </a:p>
+          <a:p>
+            <a:r>
+              <a:rPr lang="en-US" altLang="zh-CN" dirty="0">
+                <a:latin typeface="PingFang SC"/>
+              </a:rPr>
+              <a:t>Local search + Group migration</a:t>
+            </a:r>
+          </a:p>
+          <a:p>
+            <a:r>
+              <a:rPr lang="en-US" altLang="zh-CN" dirty="0">
+                <a:latin typeface="PingFang SC"/>
+              </a:rPr>
+              <a:t>Uses Hypervolume as a performance indicator</a:t>
+            </a:r>
+          </a:p>
+          <a:p>
+            <a:r>
+              <a:rPr lang="en-US" altLang="zh-CN" dirty="0">
+                <a:latin typeface="PingFang SC"/>
+              </a:rPr>
+              <a:t>Uses Gradient information as a heuristic algorithm</a:t>
+            </a:r>
+          </a:p>
         </p:txBody>
       </p:sp>
       <p:cxnSp>
@@ -5761,7 +6259,7 @@
 </p:sld>
 </file>
 
-<file path=ppt/slides/slide12.xml><?xml version="1.0" encoding="utf-8"?>
+<file path=ppt/slides/slide14.xml><?xml version="1.0" encoding="utf-8"?>
 <p:sld xmlns:a="http://schemas.openxmlformats.org/drawingml/2006/main" xmlns:r="http://schemas.openxmlformats.org/officeDocument/2006/relationships" xmlns:p="http://schemas.openxmlformats.org/presentationml/2006/main">
   <p:cSld>
     <p:spTree>
@@ -6055,7 +6553,7 @@
 </p:sld>
 </file>
 
-<file path=ppt/slides/slide13.xml><?xml version="1.0" encoding="utf-8"?>
+<file path=ppt/slides/slide15.xml><?xml version="1.0" encoding="utf-8"?>
 <p:sld xmlns:a="http://schemas.openxmlformats.org/drawingml/2006/main" xmlns:r="http://schemas.openxmlformats.org/officeDocument/2006/relationships" xmlns:p="http://schemas.openxmlformats.org/presentationml/2006/main">
   <p:cSld>
     <p:spTree>
@@ -6302,7 +6800,7 @@
 </p:sld>
 </file>
 
-<file path=ppt/slides/slide14.xml><?xml version="1.0" encoding="utf-8"?>
+<file path=ppt/slides/slide16.xml><?xml version="1.0" encoding="utf-8"?>
 <p:sld xmlns:a="http://schemas.openxmlformats.org/drawingml/2006/main" xmlns:r="http://schemas.openxmlformats.org/officeDocument/2006/relationships" xmlns:p="http://schemas.openxmlformats.org/presentationml/2006/main">
   <p:cSld>
     <p:spTree>
@@ -8530,6 +9028,131 @@
     <p:extLst>
       <p:ext uri="{BB962C8B-B14F-4D97-AF65-F5344CB8AC3E}">
         <p14:creationId xmlns:p14="http://schemas.microsoft.com/office/powerpoint/2010/main" val="1392603136"/>
+      </p:ext>
+    </p:extLst>
+  </p:cSld>
+  <p:clrMapOvr>
+    <a:masterClrMapping/>
+  </p:clrMapOvr>
+</p:sld>
+</file>
+
+<file path=ppt/slides/slide17.xml><?xml version="1.0" encoding="utf-8"?>
+<p:sld xmlns:a="http://schemas.openxmlformats.org/drawingml/2006/main" xmlns:r="http://schemas.openxmlformats.org/officeDocument/2006/relationships" xmlns:p="http://schemas.openxmlformats.org/presentationml/2006/main">
+  <p:cSld>
+    <p:spTree>
+      <p:nvGrpSpPr>
+        <p:cNvPr id="1" name=""/>
+        <p:cNvGrpSpPr/>
+        <p:nvPr/>
+      </p:nvGrpSpPr>
+      <p:grpSpPr>
+        <a:xfrm>
+          <a:off x="0" y="0"/>
+          <a:ext cx="0" cy="0"/>
+          <a:chOff x="0" y="0"/>
+          <a:chExt cx="0" cy="0"/>
+        </a:xfrm>
+      </p:grpSpPr>
+      <p:sp>
+        <p:nvSpPr>
+          <p:cNvPr id="2" name="Title 1">
+            <a:extLst>
+              <a:ext uri="{FF2B5EF4-FFF2-40B4-BE49-F238E27FC236}">
+                <a16:creationId xmlns:a16="http://schemas.microsoft.com/office/drawing/2014/main" id="{93861DE4-B137-FFA5-E732-903EB505269D}"/>
+              </a:ext>
+            </a:extLst>
+          </p:cNvPr>
+          <p:cNvSpPr>
+            <a:spLocks noGrp="1"/>
+          </p:cNvSpPr>
+          <p:nvPr>
+            <p:ph type="title"/>
+          </p:nvPr>
+        </p:nvSpPr>
+        <p:spPr>
+          <a:xfrm>
+            <a:off x="7394642" y="74125"/>
+            <a:ext cx="10515600" cy="1325563"/>
+          </a:xfrm>
+        </p:spPr>
+        <p:txBody>
+          <a:bodyPr/>
+          <a:lstStyle/>
+          <a:p>
+            <a:r>
+              <a:rPr lang="en-US" dirty="0">
+                <a:latin typeface="Times New Roman" panose="02020603050405020304" pitchFamily="18" charset="0"/>
+                <a:cs typeface="Times New Roman" panose="02020603050405020304" pitchFamily="18" charset="0"/>
+              </a:rPr>
+              <a:t>References</a:t>
+            </a:r>
+          </a:p>
+        </p:txBody>
+      </p:sp>
+      <p:pic>
+        <p:nvPicPr>
+          <p:cNvPr id="5" name="Content Placeholder 4">
+            <a:extLst>
+              <a:ext uri="{FF2B5EF4-FFF2-40B4-BE49-F238E27FC236}">
+                <a16:creationId xmlns:a16="http://schemas.microsoft.com/office/drawing/2014/main" id="{932D6E71-5D9F-E168-580E-D37172635953}"/>
+              </a:ext>
+            </a:extLst>
+          </p:cNvPr>
+          <p:cNvPicPr>
+            <a:picLocks noGrp="1" noChangeAspect="1"/>
+          </p:cNvPicPr>
+          <p:nvPr>
+            <p:ph idx="1"/>
+          </p:nvPr>
+        </p:nvPicPr>
+        <p:blipFill>
+          <a:blip r:embed="rId2"/>
+          <a:stretch>
+            <a:fillRect/>
+          </a:stretch>
+        </p:blipFill>
+        <p:spPr>
+          <a:xfrm>
+            <a:off x="0" y="74125"/>
+            <a:ext cx="5547049" cy="6709750"/>
+          </a:xfrm>
+        </p:spPr>
+      </p:pic>
+      <p:pic>
+        <p:nvPicPr>
+          <p:cNvPr id="7" name="Picture 6">
+            <a:extLst>
+              <a:ext uri="{FF2B5EF4-FFF2-40B4-BE49-F238E27FC236}">
+                <a16:creationId xmlns:a16="http://schemas.microsoft.com/office/drawing/2014/main" id="{A4B334EC-13CE-7244-6229-DEA35D5BA151}"/>
+              </a:ext>
+            </a:extLst>
+          </p:cNvPr>
+          <p:cNvPicPr>
+            <a:picLocks noChangeAspect="1"/>
+          </p:cNvPicPr>
+          <p:nvPr/>
+        </p:nvPicPr>
+        <p:blipFill>
+          <a:blip r:embed="rId3"/>
+          <a:stretch>
+            <a:fillRect/>
+          </a:stretch>
+        </p:blipFill>
+        <p:spPr>
+          <a:xfrm>
+            <a:off x="5547049" y="1672061"/>
+            <a:ext cx="6496050" cy="962025"/>
+          </a:xfrm>
+          <a:prstGeom prst="rect">
+            <a:avLst/>
+          </a:prstGeom>
+        </p:spPr>
+      </p:pic>
+    </p:spTree>
+    <p:extLst>
+      <p:ext uri="{BB962C8B-B14F-4D97-AF65-F5344CB8AC3E}">
+        <p14:creationId xmlns:p14="http://schemas.microsoft.com/office/powerpoint/2010/main" val="4036208059"/>
       </p:ext>
     </p:extLst>
   </p:cSld>

</xml_diff>